<commit_message>
verified submodels of drag and radiation
</commit_message>
<xml_diff>
--- a/radiation/radiaition model notes.pptx
+++ b/radiation/radiaition model notes.pptx
@@ -265,7 +265,7 @@
           <a:p>
             <a:fld id="{DA1E653C-AC08-4FB0-9660-6C1856F0EDCE}" type="datetimeFigureOut">
               <a:rPr lang="en-US" smtClean="0"/>
-              <a:t>2/25/2022</a:t>
+              <a:t>2/28/2022</a:t>
             </a:fld>
             <a:endParaRPr lang="en-US"/>
           </a:p>
@@ -463,7 +463,7 @@
           <a:p>
             <a:fld id="{DA1E653C-AC08-4FB0-9660-6C1856F0EDCE}" type="datetimeFigureOut">
               <a:rPr lang="en-US" smtClean="0"/>
-              <a:t>2/25/2022</a:t>
+              <a:t>2/28/2022</a:t>
             </a:fld>
             <a:endParaRPr lang="en-US"/>
           </a:p>
@@ -671,7 +671,7 @@
           <a:p>
             <a:fld id="{DA1E653C-AC08-4FB0-9660-6C1856F0EDCE}" type="datetimeFigureOut">
               <a:rPr lang="en-US" smtClean="0"/>
-              <a:t>2/25/2022</a:t>
+              <a:t>2/28/2022</a:t>
             </a:fld>
             <a:endParaRPr lang="en-US"/>
           </a:p>
@@ -869,7 +869,7 @@
           <a:p>
             <a:fld id="{DA1E653C-AC08-4FB0-9660-6C1856F0EDCE}" type="datetimeFigureOut">
               <a:rPr lang="en-US" smtClean="0"/>
-              <a:t>2/25/2022</a:t>
+              <a:t>2/28/2022</a:t>
             </a:fld>
             <a:endParaRPr lang="en-US"/>
           </a:p>
@@ -1144,7 +1144,7 @@
           <a:p>
             <a:fld id="{DA1E653C-AC08-4FB0-9660-6C1856F0EDCE}" type="datetimeFigureOut">
               <a:rPr lang="en-US" smtClean="0"/>
-              <a:t>2/25/2022</a:t>
+              <a:t>2/28/2022</a:t>
             </a:fld>
             <a:endParaRPr lang="en-US"/>
           </a:p>
@@ -1409,7 +1409,7 @@
           <a:p>
             <a:fld id="{DA1E653C-AC08-4FB0-9660-6C1856F0EDCE}" type="datetimeFigureOut">
               <a:rPr lang="en-US" smtClean="0"/>
-              <a:t>2/25/2022</a:t>
+              <a:t>2/28/2022</a:t>
             </a:fld>
             <a:endParaRPr lang="en-US"/>
           </a:p>
@@ -1821,7 +1821,7 @@
           <a:p>
             <a:fld id="{DA1E653C-AC08-4FB0-9660-6C1856F0EDCE}" type="datetimeFigureOut">
               <a:rPr lang="en-US" smtClean="0"/>
-              <a:t>2/25/2022</a:t>
+              <a:t>2/28/2022</a:t>
             </a:fld>
             <a:endParaRPr lang="en-US"/>
           </a:p>
@@ -1962,7 +1962,7 @@
           <a:p>
             <a:fld id="{DA1E653C-AC08-4FB0-9660-6C1856F0EDCE}" type="datetimeFigureOut">
               <a:rPr lang="en-US" smtClean="0"/>
-              <a:t>2/25/2022</a:t>
+              <a:t>2/28/2022</a:t>
             </a:fld>
             <a:endParaRPr lang="en-US"/>
           </a:p>
@@ -2075,7 +2075,7 @@
           <a:p>
             <a:fld id="{DA1E653C-AC08-4FB0-9660-6C1856F0EDCE}" type="datetimeFigureOut">
               <a:rPr lang="en-US" smtClean="0"/>
-              <a:t>2/25/2022</a:t>
+              <a:t>2/28/2022</a:t>
             </a:fld>
             <a:endParaRPr lang="en-US"/>
           </a:p>
@@ -2386,7 +2386,7 @@
           <a:p>
             <a:fld id="{DA1E653C-AC08-4FB0-9660-6C1856F0EDCE}" type="datetimeFigureOut">
               <a:rPr lang="en-US" smtClean="0"/>
-              <a:t>2/25/2022</a:t>
+              <a:t>2/28/2022</a:t>
             </a:fld>
             <a:endParaRPr lang="en-US"/>
           </a:p>
@@ -2674,7 +2674,7 @@
           <a:p>
             <a:fld id="{DA1E653C-AC08-4FB0-9660-6C1856F0EDCE}" type="datetimeFigureOut">
               <a:rPr lang="en-US" smtClean="0"/>
-              <a:t>2/25/2022</a:t>
+              <a:t>2/28/2022</a:t>
             </a:fld>
             <a:endParaRPr lang="en-US"/>
           </a:p>
@@ -2915,7 +2915,7 @@
           <a:p>
             <a:fld id="{DA1E653C-AC08-4FB0-9660-6C1856F0EDCE}" type="datetimeFigureOut">
               <a:rPr lang="en-US" smtClean="0"/>
-              <a:t>2/25/2022</a:t>
+              <a:t>2/28/2022</a:t>
             </a:fld>
             <a:endParaRPr lang="en-US"/>
           </a:p>
@@ -3573,8 +3573,8 @@
           </a:p>
         </p:txBody>
       </p:sp>
-      <mc:AlternateContent xmlns:mc="http://schemas.openxmlformats.org/markup-compatibility/2006">
-        <mc:Choice xmlns:a14="http://schemas.microsoft.com/office/drawing/2010/main" Requires="a14">
+      <mc:AlternateContent xmlns:mc="http://schemas.openxmlformats.org/markup-compatibility/2006" xmlns:a14="http://schemas.microsoft.com/office/drawing/2010/main">
+        <mc:Choice Requires="a14">
           <p:sp>
             <p:nvSpPr>
               <p:cNvPr id="16" name="TextBox 15">
@@ -3667,7 +3667,7 @@
             </p:txBody>
           </p:sp>
         </mc:Choice>
-        <mc:Fallback>
+        <mc:Fallback xmlns="">
           <p:sp>
             <p:nvSpPr>
               <p:cNvPr id="16" name="TextBox 15">
@@ -3935,7 +3935,7 @@
             </p:nvSpPr>
             <p:spPr>
               <a:xfrm>
-                <a:off x="475791" y="3305935"/>
+                <a:off x="0" y="3332239"/>
                 <a:ext cx="11089242" cy="865493"/>
               </a:xfrm>
               <a:prstGeom prst="rect">
@@ -3970,12 +3970,6 @@
                             </a:rPr>
                             <m:t>𝑑</m:t>
                           </m:r>
-                          <m:r>
-                            <a:rPr lang="en-US" sz="2400" b="0" i="1" smtClean="0">
-                              <a:latin typeface="Cambria Math" panose="02040503050406030204" pitchFamily="18" charset="0"/>
-                            </a:rPr>
-                            <m:t>𝐼</m:t>
-                          </m:r>
                         </m:num>
                         <m:den>
                           <m:r>
@@ -3986,6 +3980,68 @@
                           </m:r>
                         </m:den>
                       </m:f>
+                      <m:d>
+                        <m:dPr>
+                          <m:ctrlPr>
+                            <a:rPr lang="en-US" sz="2400" i="1">
+                              <a:latin typeface="Cambria Math" panose="02040503050406030204" pitchFamily="18" charset="0"/>
+                            </a:rPr>
+                          </m:ctrlPr>
+                        </m:dPr>
+                        <m:e>
+                          <m:d>
+                            <m:dPr>
+                              <m:ctrlPr>
+                                <a:rPr lang="en-US" sz="2400" i="1">
+                                  <a:latin typeface="Cambria Math" panose="02040503050406030204" pitchFamily="18" charset="0"/>
+                                </a:rPr>
+                              </m:ctrlPr>
+                            </m:dPr>
+                            <m:e>
+                              <m:r>
+                                <a:rPr lang="en-US" sz="2400">
+                                  <a:latin typeface="Cambria Math" panose="02040503050406030204" pitchFamily="18" charset="0"/>
+                                </a:rPr>
+                                <m:t>1−</m:t>
+                              </m:r>
+                              <m:sSub>
+                                <m:sSubPr>
+                                  <m:ctrlPr>
+                                    <a:rPr lang="en-US" sz="2400" i="1">
+                                      <a:latin typeface="Cambria Math" panose="02040503050406030204" pitchFamily="18" charset="0"/>
+                                    </a:rPr>
+                                  </m:ctrlPr>
+                                </m:sSubPr>
+                                <m:e>
+                                  <m:r>
+                                    <a:rPr lang="en-US" sz="2400" i="1">
+                                      <a:latin typeface="Cambria Math" panose="02040503050406030204" pitchFamily="18" charset="0"/>
+                                    </a:rPr>
+                                    <m:t>𝛽</m:t>
+                                  </m:r>
+                                </m:e>
+                                <m:sub>
+                                  <m:r>
+                                    <a:rPr lang="en-US" sz="2400" i="1">
+                                      <a:latin typeface="Cambria Math" panose="02040503050406030204" pitchFamily="18" charset="0"/>
+                                    </a:rPr>
+                                    <m:t>𝑠</m:t>
+                                  </m:r>
+                                </m:sub>
+                              </m:sSub>
+                            </m:e>
+                          </m:d>
+                          <m:r>
+                            <m:rPr>
+                              <m:sty m:val="p"/>
+                            </m:rPr>
+                            <a:rPr lang="en-US" sz="2400">
+                              <a:latin typeface="Cambria Math" panose="02040503050406030204" pitchFamily="18" charset="0"/>
+                            </a:rPr>
+                            <m:t>I</m:t>
+                          </m:r>
+                        </m:e>
+                      </m:d>
                       <m:r>
                         <a:rPr lang="en-US" sz="2400">
                           <a:latin typeface="Cambria Math" panose="02040503050406030204" pitchFamily="18" charset="0"/>
@@ -4485,7 +4541,7 @@
             </p:nvSpPr>
             <p:spPr>
               <a:xfrm>
-                <a:off x="475791" y="3305935"/>
+                <a:off x="0" y="3332239"/>
                 <a:ext cx="11089242" cy="865493"/>
               </a:xfrm>
               <a:prstGeom prst="rect">
@@ -4513,8 +4569,8 @@
           </p:sp>
         </mc:Fallback>
       </mc:AlternateContent>
-      <mc:AlternateContent xmlns:mc="http://schemas.openxmlformats.org/markup-compatibility/2006">
-        <mc:Choice xmlns:a14="http://schemas.microsoft.com/office/drawing/2010/main" Requires="a14">
+      <mc:AlternateContent xmlns:mc="http://schemas.openxmlformats.org/markup-compatibility/2006" xmlns:a14="http://schemas.microsoft.com/office/drawing/2010/main">
+        <mc:Choice Requires="a14">
           <p:sp>
             <p:nvSpPr>
               <p:cNvPr id="5" name="Rectangle 4">
@@ -4780,7 +4836,7 @@
             </p:txBody>
           </p:sp>
         </mc:Choice>
-        <mc:Fallback>
+        <mc:Fallback xmlns="">
           <p:sp>
             <p:nvSpPr>
               <p:cNvPr id="5" name="Rectangle 4">
@@ -4825,8 +4881,8 @@
           </p:sp>
         </mc:Fallback>
       </mc:AlternateContent>
-      <mc:AlternateContent xmlns:mc="http://schemas.openxmlformats.org/markup-compatibility/2006">
-        <mc:Choice xmlns:a14="http://schemas.microsoft.com/office/drawing/2010/main" Requires="a14">
+      <mc:AlternateContent xmlns:mc="http://schemas.openxmlformats.org/markup-compatibility/2006" xmlns:a14="http://schemas.microsoft.com/office/drawing/2010/main">
+        <mc:Choice Requires="a14">
           <p:sp>
             <p:nvSpPr>
               <p:cNvPr id="8" name="TextBox 7">
@@ -4855,6 +4911,7 @@
               </a:bodyPr>
               <a:lstStyle/>
               <a:p>
+                <a:pPr/>
                 <a14:m>
                   <m:oMathPara xmlns:m="http://schemas.openxmlformats.org/officeDocument/2006/math">
                     <m:oMathParaPr>
@@ -5037,7 +5094,7 @@
             </p:txBody>
           </p:sp>
         </mc:Choice>
-        <mc:Fallback>
+        <mc:Fallback xmlns="">
           <p:sp>
             <p:nvSpPr>
               <p:cNvPr id="8" name="TextBox 7">
@@ -5082,8 +5139,8 @@
           </p:sp>
         </mc:Fallback>
       </mc:AlternateContent>
-      <mc:AlternateContent xmlns:mc="http://schemas.openxmlformats.org/markup-compatibility/2006" xmlns:a14="http://schemas.microsoft.com/office/drawing/2010/main">
-        <mc:Choice Requires="a14">
+      <mc:AlternateContent xmlns:mc="http://schemas.openxmlformats.org/markup-compatibility/2006">
+        <mc:Choice xmlns:a14="http://schemas.microsoft.com/office/drawing/2010/main" Requires="a14">
           <p:sp>
             <p:nvSpPr>
               <p:cNvPr id="13" name="Rectangle 12">
@@ -5133,12 +5190,6 @@
                             </a:rPr>
                             <m:t>𝑑</m:t>
                           </m:r>
-                          <m:r>
-                            <a:rPr lang="en-US" sz="2400" b="0" i="1" smtClean="0">
-                              <a:latin typeface="Cambria Math" panose="02040503050406030204" pitchFamily="18" charset="0"/>
-                            </a:rPr>
-                            <m:t>𝐼</m:t>
-                          </m:r>
                         </m:num>
                         <m:den>
                           <m:r>
@@ -5149,6 +5200,86 @@
                           </m:r>
                         </m:den>
                       </m:f>
+                      <m:d>
+                        <m:dPr>
+                          <m:ctrlPr>
+                            <a:rPr lang="en-US" sz="2400" b="0" i="1" smtClean="0">
+                              <a:latin typeface="Cambria Math" panose="02040503050406030204" pitchFamily="18" charset="0"/>
+                            </a:rPr>
+                          </m:ctrlPr>
+                        </m:dPr>
+                        <m:e>
+                          <m:d>
+                            <m:dPr>
+                              <m:ctrlPr>
+                                <a:rPr lang="en-US" sz="2400" i="1" smtClean="0">
+                                  <a:solidFill>
+                                    <a:schemeClr val="tx1"/>
+                                  </a:solidFill>
+                                  <a:latin typeface="Cambria Math" panose="02040503050406030204" pitchFamily="18" charset="0"/>
+                                </a:rPr>
+                              </m:ctrlPr>
+                            </m:dPr>
+                            <m:e>
+                              <m:r>
+                                <a:rPr lang="en-US" sz="2400">
+                                  <a:solidFill>
+                                    <a:schemeClr val="tx1"/>
+                                  </a:solidFill>
+                                  <a:latin typeface="Cambria Math" panose="02040503050406030204" pitchFamily="18" charset="0"/>
+                                </a:rPr>
+                                <m:t>1−</m:t>
+                              </m:r>
+                              <m:sSub>
+                                <m:sSubPr>
+                                  <m:ctrlPr>
+                                    <a:rPr lang="en-US" sz="2400" i="1">
+                                      <a:solidFill>
+                                        <a:schemeClr val="tx1"/>
+                                      </a:solidFill>
+                                      <a:latin typeface="Cambria Math" panose="02040503050406030204" pitchFamily="18" charset="0"/>
+                                    </a:rPr>
+                                  </m:ctrlPr>
+                                </m:sSubPr>
+                                <m:e>
+                                  <m:r>
+                                    <a:rPr lang="en-US" sz="2400" i="1">
+                                      <a:solidFill>
+                                        <a:schemeClr val="tx1"/>
+                                      </a:solidFill>
+                                      <a:latin typeface="Cambria Math" panose="02040503050406030204" pitchFamily="18" charset="0"/>
+                                    </a:rPr>
+                                    <m:t>𝛽</m:t>
+                                  </m:r>
+                                </m:e>
+                                <m:sub>
+                                  <m:r>
+                                    <a:rPr lang="en-US" sz="2400" i="1">
+                                      <a:solidFill>
+                                        <a:schemeClr val="tx1"/>
+                                      </a:solidFill>
+                                      <a:latin typeface="Cambria Math" panose="02040503050406030204" pitchFamily="18" charset="0"/>
+                                    </a:rPr>
+                                    <m:t>𝑠</m:t>
+                                  </m:r>
+                                </m:sub>
+                              </m:sSub>
+                            </m:e>
+                          </m:d>
+                          <m:r>
+                            <m:rPr>
+                              <m:sty m:val="p"/>
+                            </m:rPr>
+                            <a:rPr lang="en-US" sz="2400">
+                              <a:solidFill>
+                                <a:schemeClr val="tx1"/>
+                              </a:solidFill>
+                              <a:latin typeface="Cambria Math" panose="02040503050406030204" pitchFamily="18" charset="0"/>
+                            </a:rPr>
+                            <m:t>I</m:t>
+                          </m:r>
+                        </m:e>
+                      </m:d>
                       <m:r>
                         <a:rPr lang="en-US" sz="2400">
                           <a:latin typeface="Cambria Math" panose="02040503050406030204" pitchFamily="18" charset="0"/>
@@ -5676,7 +5807,7 @@
             </p:txBody>
           </p:sp>
         </mc:Choice>
-        <mc:Fallback xmlns="">
+        <mc:Fallback>
           <p:sp>
             <p:nvSpPr>
               <p:cNvPr id="13" name="Rectangle 12">
@@ -5700,7 +5831,7 @@
                 <a:avLst/>
               </a:prstGeom>
               <a:blipFill>
-                <a:blip r:embed="rId6"/>
+                <a:blip r:embed="rId5"/>
                 <a:stretch>
                   <a:fillRect/>
                 </a:stretch>
@@ -5737,7 +5868,7 @@
             </p:nvSpPr>
             <p:spPr>
               <a:xfrm>
-                <a:off x="762612" y="4234840"/>
+                <a:off x="1102758" y="4286853"/>
                 <a:ext cx="11089242" cy="865301"/>
               </a:xfrm>
               <a:prstGeom prst="rect">
@@ -6263,14 +6394,14 @@
             </p:nvSpPr>
             <p:spPr>
               <a:xfrm>
-                <a:off x="762612" y="4234840"/>
+                <a:off x="1102758" y="4286853"/>
                 <a:ext cx="11089242" cy="865301"/>
               </a:xfrm>
               <a:prstGeom prst="rect">
                 <a:avLst/>
               </a:prstGeom>
               <a:blipFill>
-                <a:blip r:embed="rId7"/>
+                <a:blip r:embed="rId6"/>
                 <a:stretch>
                   <a:fillRect/>
                 </a:stretch>
@@ -6291,8 +6422,8 @@
           </p:sp>
         </mc:Fallback>
       </mc:AlternateContent>
-      <mc:AlternateContent xmlns:mc="http://schemas.openxmlformats.org/markup-compatibility/2006">
-        <mc:Choice xmlns:a14="http://schemas.microsoft.com/office/drawing/2010/main" Requires="a14">
+      <mc:AlternateContent xmlns:mc="http://schemas.openxmlformats.org/markup-compatibility/2006" xmlns:a14="http://schemas.microsoft.com/office/drawing/2010/main">
+        <mc:Choice Requires="a14">
           <p:sp>
             <p:nvSpPr>
               <p:cNvPr id="17" name="TextBox 16">
@@ -6321,6 +6452,7 @@
               </a:bodyPr>
               <a:lstStyle/>
               <a:p>
+                <a:pPr/>
                 <a14:m>
                   <m:oMathPara xmlns:m="http://schemas.openxmlformats.org/officeDocument/2006/math">
                     <m:oMathParaPr>
@@ -6524,7 +6656,7 @@
             </p:txBody>
           </p:sp>
         </mc:Choice>
-        <mc:Fallback>
+        <mc:Fallback xmlns="">
           <p:sp>
             <p:nvSpPr>
               <p:cNvPr id="17" name="TextBox 16">
@@ -8041,8 +8173,8 @@
           <a:chExt cx="0" cy="0"/>
         </a:xfrm>
       </p:grpSpPr>
-      <mc:AlternateContent xmlns:mc="http://schemas.openxmlformats.org/markup-compatibility/2006">
-        <mc:Choice xmlns:a14="http://schemas.microsoft.com/office/drawing/2010/main" Requires="a14">
+      <mc:AlternateContent xmlns:mc="http://schemas.openxmlformats.org/markup-compatibility/2006" xmlns:a14="http://schemas.microsoft.com/office/drawing/2010/main">
+        <mc:Choice Requires="a14">
           <p:sp>
             <p:nvSpPr>
               <p:cNvPr id="2" name="Title 1">
@@ -8141,7 +8273,7 @@
             </p:txBody>
           </p:sp>
         </mc:Choice>
-        <mc:Fallback>
+        <mc:Fallback xmlns="">
           <p:sp>
             <p:nvSpPr>
               <p:cNvPr id="2" name="Title 1">
@@ -8354,8 +8486,8 @@
           </a:p>
         </p:txBody>
       </p:sp>
-      <mc:AlternateContent xmlns:mc="http://schemas.openxmlformats.org/markup-compatibility/2006">
-        <mc:Choice xmlns:a14="http://schemas.microsoft.com/office/drawing/2010/main" Requires="a14">
+      <mc:AlternateContent xmlns:mc="http://schemas.openxmlformats.org/markup-compatibility/2006" xmlns:a14="http://schemas.microsoft.com/office/drawing/2010/main">
+        <mc:Choice Requires="a14">
           <p:sp>
             <p:nvSpPr>
               <p:cNvPr id="9" name="TextBox 8">
@@ -8505,7 +8637,7 @@
             </p:txBody>
           </p:sp>
         </mc:Choice>
-        <mc:Fallback>
+        <mc:Fallback xmlns="">
           <p:sp>
             <p:nvSpPr>
               <p:cNvPr id="9" name="TextBox 8">
@@ -8589,8 +8721,8 @@
           </a:p>
         </p:txBody>
       </p:sp>
-      <mc:AlternateContent xmlns:mc="http://schemas.openxmlformats.org/markup-compatibility/2006">
-        <mc:Choice xmlns:a14="http://schemas.microsoft.com/office/drawing/2010/main" Requires="a14">
+      <mc:AlternateContent xmlns:mc="http://schemas.openxmlformats.org/markup-compatibility/2006" xmlns:a14="http://schemas.microsoft.com/office/drawing/2010/main">
+        <mc:Choice Requires="a14">
           <p:sp>
             <p:nvSpPr>
               <p:cNvPr id="10" name="Rectangle 9">
@@ -9167,7 +9299,7 @@
             </p:txBody>
           </p:sp>
         </mc:Choice>
-        <mc:Fallback>
+        <mc:Fallback xmlns="">
           <p:sp>
             <p:nvSpPr>
               <p:cNvPr id="10" name="Rectangle 9">
@@ -10301,8 +10433,8 @@
           </a:p>
         </p:txBody>
       </p:sp>
-      <mc:AlternateContent xmlns:mc="http://schemas.openxmlformats.org/markup-compatibility/2006">
-        <mc:Choice xmlns:a14="http://schemas.microsoft.com/office/drawing/2010/main" Requires="a14">
+      <mc:AlternateContent xmlns:mc="http://schemas.openxmlformats.org/markup-compatibility/2006" xmlns:a14="http://schemas.microsoft.com/office/drawing/2010/main">
+        <mc:Choice Requires="a14">
           <p:sp>
             <p:nvSpPr>
               <p:cNvPr id="16" name="TextBox 15">
@@ -10645,7 +10777,7 @@
             </p:txBody>
           </p:sp>
         </mc:Choice>
-        <mc:Fallback>
+        <mc:Fallback xmlns="">
           <p:sp>
             <p:nvSpPr>
               <p:cNvPr id="16" name="TextBox 15">
@@ -11077,8 +11209,8 @@
           </p:sp>
         </mc:Fallback>
       </mc:AlternateContent>
-      <mc:AlternateContent xmlns:mc="http://schemas.openxmlformats.org/markup-compatibility/2006">
-        <mc:Choice xmlns:a14="http://schemas.microsoft.com/office/drawing/2010/main" Requires="a14">
+      <mc:AlternateContent xmlns:mc="http://schemas.openxmlformats.org/markup-compatibility/2006" xmlns:a14="http://schemas.microsoft.com/office/drawing/2010/main">
+        <mc:Choice Requires="a14">
           <p:sp>
             <p:nvSpPr>
               <p:cNvPr id="21" name="Title 1">
@@ -11177,7 +11309,7 @@
             </p:txBody>
           </p:sp>
         </mc:Choice>
-        <mc:Fallback>
+        <mc:Fallback xmlns="">
           <p:sp>
             <p:nvSpPr>
               <p:cNvPr id="21" name="Title 1">

</xml_diff>

<commit_message>
remove particle when burned
</commit_message>
<xml_diff>
--- a/radiation/radiaition model notes.pptx
+++ b/radiation/radiaition model notes.pptx
@@ -265,7 +265,7 @@
           <a:p>
             <a:fld id="{DA1E653C-AC08-4FB0-9660-6C1856F0EDCE}" type="datetimeFigureOut">
               <a:rPr lang="en-US" smtClean="0"/>
-              <a:t>2/28/2022</a:t>
+              <a:t>3/18/2022</a:t>
             </a:fld>
             <a:endParaRPr lang="en-US"/>
           </a:p>
@@ -463,7 +463,7 @@
           <a:p>
             <a:fld id="{DA1E653C-AC08-4FB0-9660-6C1856F0EDCE}" type="datetimeFigureOut">
               <a:rPr lang="en-US" smtClean="0"/>
-              <a:t>2/28/2022</a:t>
+              <a:t>3/18/2022</a:t>
             </a:fld>
             <a:endParaRPr lang="en-US"/>
           </a:p>
@@ -671,7 +671,7 @@
           <a:p>
             <a:fld id="{DA1E653C-AC08-4FB0-9660-6C1856F0EDCE}" type="datetimeFigureOut">
               <a:rPr lang="en-US" smtClean="0"/>
-              <a:t>2/28/2022</a:t>
+              <a:t>3/18/2022</a:t>
             </a:fld>
             <a:endParaRPr lang="en-US"/>
           </a:p>
@@ -869,7 +869,7 @@
           <a:p>
             <a:fld id="{DA1E653C-AC08-4FB0-9660-6C1856F0EDCE}" type="datetimeFigureOut">
               <a:rPr lang="en-US" smtClean="0"/>
-              <a:t>2/28/2022</a:t>
+              <a:t>3/18/2022</a:t>
             </a:fld>
             <a:endParaRPr lang="en-US"/>
           </a:p>
@@ -1144,7 +1144,7 @@
           <a:p>
             <a:fld id="{DA1E653C-AC08-4FB0-9660-6C1856F0EDCE}" type="datetimeFigureOut">
               <a:rPr lang="en-US" smtClean="0"/>
-              <a:t>2/28/2022</a:t>
+              <a:t>3/18/2022</a:t>
             </a:fld>
             <a:endParaRPr lang="en-US"/>
           </a:p>
@@ -1409,7 +1409,7 @@
           <a:p>
             <a:fld id="{DA1E653C-AC08-4FB0-9660-6C1856F0EDCE}" type="datetimeFigureOut">
               <a:rPr lang="en-US" smtClean="0"/>
-              <a:t>2/28/2022</a:t>
+              <a:t>3/18/2022</a:t>
             </a:fld>
             <a:endParaRPr lang="en-US"/>
           </a:p>
@@ -1821,7 +1821,7 @@
           <a:p>
             <a:fld id="{DA1E653C-AC08-4FB0-9660-6C1856F0EDCE}" type="datetimeFigureOut">
               <a:rPr lang="en-US" smtClean="0"/>
-              <a:t>2/28/2022</a:t>
+              <a:t>3/18/2022</a:t>
             </a:fld>
             <a:endParaRPr lang="en-US"/>
           </a:p>
@@ -1962,7 +1962,7 @@
           <a:p>
             <a:fld id="{DA1E653C-AC08-4FB0-9660-6C1856F0EDCE}" type="datetimeFigureOut">
               <a:rPr lang="en-US" smtClean="0"/>
-              <a:t>2/28/2022</a:t>
+              <a:t>3/18/2022</a:t>
             </a:fld>
             <a:endParaRPr lang="en-US"/>
           </a:p>
@@ -2075,7 +2075,7 @@
           <a:p>
             <a:fld id="{DA1E653C-AC08-4FB0-9660-6C1856F0EDCE}" type="datetimeFigureOut">
               <a:rPr lang="en-US" smtClean="0"/>
-              <a:t>2/28/2022</a:t>
+              <a:t>3/18/2022</a:t>
             </a:fld>
             <a:endParaRPr lang="en-US"/>
           </a:p>
@@ -2386,7 +2386,7 @@
           <a:p>
             <a:fld id="{DA1E653C-AC08-4FB0-9660-6C1856F0EDCE}" type="datetimeFigureOut">
               <a:rPr lang="en-US" smtClean="0"/>
-              <a:t>2/28/2022</a:t>
+              <a:t>3/18/2022</a:t>
             </a:fld>
             <a:endParaRPr lang="en-US"/>
           </a:p>
@@ -2674,7 +2674,7 @@
           <a:p>
             <a:fld id="{DA1E653C-AC08-4FB0-9660-6C1856F0EDCE}" type="datetimeFigureOut">
               <a:rPr lang="en-US" smtClean="0"/>
-              <a:t>2/28/2022</a:t>
+              <a:t>3/18/2022</a:t>
             </a:fld>
             <a:endParaRPr lang="en-US"/>
           </a:p>
@@ -2915,7 +2915,7 @@
           <a:p>
             <a:fld id="{DA1E653C-AC08-4FB0-9660-6C1856F0EDCE}" type="datetimeFigureOut">
               <a:rPr lang="en-US" smtClean="0"/>
-              <a:t>2/28/2022</a:t>
+              <a:t>3/18/2022</a:t>
             </a:fld>
             <a:endParaRPr lang="en-US"/>
           </a:p>
@@ -3919,8 +3919,8 @@
           </a:p>
         </p:txBody>
       </p:sp>
-      <mc:AlternateContent xmlns:mc="http://schemas.openxmlformats.org/markup-compatibility/2006">
-        <mc:Choice xmlns:a14="http://schemas.microsoft.com/office/drawing/2010/main" Requires="a14">
+      <mc:AlternateContent xmlns:mc="http://schemas.openxmlformats.org/markup-compatibility/2006" xmlns:a14="http://schemas.microsoft.com/office/drawing/2010/main">
+        <mc:Choice Requires="a14">
           <p:sp>
             <p:nvSpPr>
               <p:cNvPr id="4" name="Rectangle 3">
@@ -4524,7 +4524,7 @@
             </p:txBody>
           </p:sp>
         </mc:Choice>
-        <mc:Fallback>
+        <mc:Fallback xmlns="">
           <p:sp>
             <p:nvSpPr>
               <p:cNvPr id="4" name="Rectangle 3">
@@ -5139,8 +5139,8 @@
           </p:sp>
         </mc:Fallback>
       </mc:AlternateContent>
-      <mc:AlternateContent xmlns:mc="http://schemas.openxmlformats.org/markup-compatibility/2006">
-        <mc:Choice xmlns:a14="http://schemas.microsoft.com/office/drawing/2010/main" Requires="a14">
+      <mc:AlternateContent xmlns:mc="http://schemas.openxmlformats.org/markup-compatibility/2006" xmlns:a14="http://schemas.microsoft.com/office/drawing/2010/main">
+        <mc:Choice Requires="a14">
           <p:sp>
             <p:nvSpPr>
               <p:cNvPr id="13" name="Rectangle 12">
@@ -5807,7 +5807,7 @@
             </p:txBody>
           </p:sp>
         </mc:Choice>
-        <mc:Fallback>
+        <mc:Fallback xmlns="">
           <p:sp>
             <p:nvSpPr>
               <p:cNvPr id="13" name="Rectangle 12">
@@ -5852,8 +5852,8 @@
           </p:sp>
         </mc:Fallback>
       </mc:AlternateContent>
-      <mc:AlternateContent xmlns:mc="http://schemas.openxmlformats.org/markup-compatibility/2006">
-        <mc:Choice xmlns:a14="http://schemas.microsoft.com/office/drawing/2010/main" Requires="a14">
+      <mc:AlternateContent xmlns:mc="http://schemas.openxmlformats.org/markup-compatibility/2006" xmlns:a14="http://schemas.microsoft.com/office/drawing/2010/main">
+        <mc:Choice Requires="a14">
           <p:sp>
             <p:nvSpPr>
               <p:cNvPr id="15" name="Rectangle 14">
@@ -6377,7 +6377,7 @@
             </p:txBody>
           </p:sp>
         </mc:Choice>
-        <mc:Fallback>
+        <mc:Fallback xmlns="">
           <p:sp>
             <p:nvSpPr>
               <p:cNvPr id="15" name="Rectangle 14">
@@ -7495,8 +7495,8 @@
           </a:p>
         </p:txBody>
       </p:sp>
-      <mc:AlternateContent xmlns:mc="http://schemas.openxmlformats.org/markup-compatibility/2006" xmlns:a14="http://schemas.microsoft.com/office/drawing/2010/main">
-        <mc:Choice Requires="a14">
+      <mc:AlternateContent xmlns:mc="http://schemas.openxmlformats.org/markup-compatibility/2006">
+        <mc:Choice xmlns:a14="http://schemas.microsoft.com/office/drawing/2010/main" Requires="a14">
           <p:sp>
             <p:nvSpPr>
               <p:cNvPr id="4" name="TextBox 3">
@@ -7512,7 +7512,7 @@
             <p:spPr>
               <a:xfrm>
                 <a:off x="934948" y="1592495"/>
-                <a:ext cx="4982967" cy="3697038"/>
+                <a:ext cx="4982967" cy="3401829"/>
               </a:xfrm>
               <a:prstGeom prst="rect">
                 <a:avLst/>
@@ -7702,63 +7702,6 @@
                           </a:rPr>
                           <m:t>4</m:t>
                         </m:r>
-                        <m:d>
-                          <m:dPr>
-                            <m:ctrlPr>
-                              <a:rPr lang="en-US" sz="2800" i="1">
-                                <a:solidFill>
-                                  <a:srgbClr val="FF0000"/>
-                                </a:solidFill>
-                                <a:latin typeface="Cambria Math" panose="02040503050406030204" pitchFamily="18" charset="0"/>
-                              </a:rPr>
-                            </m:ctrlPr>
-                          </m:dPr>
-                          <m:e>
-                            <m:r>
-                              <a:rPr lang="en-US" sz="2800" i="1">
-                                <a:solidFill>
-                                  <a:srgbClr val="FF0000"/>
-                                </a:solidFill>
-                                <a:latin typeface="Cambria Math" panose="02040503050406030204" pitchFamily="18" charset="0"/>
-                              </a:rPr>
-                              <m:t>1−</m:t>
-                            </m:r>
-                            <m:sSub>
-                              <m:sSubPr>
-                                <m:ctrlPr>
-                                  <a:rPr lang="en-US" sz="2800" i="1">
-                                    <a:solidFill>
-                                      <a:srgbClr val="FF0000"/>
-                                    </a:solidFill>
-                                    <a:latin typeface="Cambria Math" panose="02040503050406030204" pitchFamily="18" charset="0"/>
-                                  </a:rPr>
-                                </m:ctrlPr>
-                              </m:sSubPr>
-                              <m:e>
-                                <m:r>
-                                  <a:rPr lang="en-US" sz="2800" i="1">
-                                    <a:solidFill>
-                                      <a:srgbClr val="FF0000"/>
-                                    </a:solidFill>
-                                    <a:latin typeface="Cambria Math" panose="02040503050406030204" pitchFamily="18" charset="0"/>
-                                  </a:rPr>
-                                  <m:t>𝛽</m:t>
-                                </m:r>
-                              </m:e>
-                              <m:sub>
-                                <m:r>
-                                  <a:rPr lang="en-US" sz="2800" i="1">
-                                    <a:solidFill>
-                                      <a:srgbClr val="FF0000"/>
-                                    </a:solidFill>
-                                    <a:latin typeface="Cambria Math" panose="02040503050406030204" pitchFamily="18" charset="0"/>
-                                  </a:rPr>
-                                  <m:t>𝑠</m:t>
-                                </m:r>
-                              </m:sub>
-                            </m:sSub>
-                          </m:e>
-                        </m:d>
                       </m:den>
                     </m:f>
                   </m:oMath>
@@ -7816,88 +7759,110 @@
                 </a:r>
                 <a14:m>
                   <m:oMath xmlns:m="http://schemas.openxmlformats.org/officeDocument/2006/math">
-                    <m:f>
-                      <m:fPr>
+                    <m:r>
+                      <a:rPr lang="en-US" sz="2800" b="0" i="1" smtClean="0">
+                        <a:solidFill>
+                          <a:srgbClr val="FF0000"/>
+                        </a:solidFill>
+                        <a:latin typeface="Cambria Math" panose="02040503050406030204" pitchFamily="18" charset="0"/>
+                      </a:rPr>
+                      <m:t>4 </m:t>
+                    </m:r>
+                    <m:sSub>
+                      <m:sSubPr>
                         <m:ctrlPr>
-                          <a:rPr lang="en-US" sz="2800" i="1" smtClean="0">
+                          <a:rPr lang="en-US" sz="2800" b="0" i="1" smtClean="0">
                             <a:solidFill>
                               <a:srgbClr val="FF0000"/>
                             </a:solidFill>
                             <a:latin typeface="Cambria Math" panose="02040503050406030204" pitchFamily="18" charset="0"/>
                           </a:rPr>
                         </m:ctrlPr>
-                      </m:fPr>
-                      <m:num>
-                        <m:sSub>
-                          <m:sSubPr>
-                            <m:ctrlPr>
-                              <a:rPr lang="en-US" sz="2800" i="1">
-                                <a:solidFill>
-                                  <a:srgbClr val="FF0000"/>
-                                </a:solidFill>
-                                <a:latin typeface="Cambria Math" panose="02040503050406030204" pitchFamily="18" charset="0"/>
-                              </a:rPr>
-                            </m:ctrlPr>
-                          </m:sSubPr>
-                          <m:e>
-                            <m:r>
-                              <a:rPr lang="en-US" sz="2800" i="1">
-                                <a:solidFill>
-                                  <a:srgbClr val="FF0000"/>
-                                </a:solidFill>
-                                <a:latin typeface="Cambria Math" panose="02040503050406030204" pitchFamily="18" charset="0"/>
-                              </a:rPr>
-                              <m:t>𝛴</m:t>
-                            </m:r>
-                          </m:e>
-                          <m:sub>
-                            <m:r>
-                              <a:rPr lang="en-US" sz="2800" i="1">
-                                <a:solidFill>
-                                  <a:srgbClr val="FF0000"/>
-                                </a:solidFill>
-                                <a:latin typeface="Cambria Math" panose="02040503050406030204" pitchFamily="18" charset="0"/>
-                              </a:rPr>
-                              <m:t>𝑝</m:t>
-                            </m:r>
-                          </m:sub>
-                        </m:sSub>
-                        <m:sSub>
-                          <m:sSubPr>
-                            <m:ctrlPr>
-                              <a:rPr lang="en-US" sz="2800" i="1">
-                                <a:solidFill>
-                                  <a:srgbClr val="FF0000"/>
-                                </a:solidFill>
-                                <a:latin typeface="Cambria Math" panose="02040503050406030204" pitchFamily="18" charset="0"/>
-                              </a:rPr>
-                            </m:ctrlPr>
-                          </m:sSubPr>
-                          <m:e>
-                            <m:r>
-                              <a:rPr lang="en-US" sz="2800" i="1">
-                                <a:solidFill>
-                                  <a:srgbClr val="FF0000"/>
-                                </a:solidFill>
-                                <a:latin typeface="Cambria Math" panose="02040503050406030204" pitchFamily="18" charset="0"/>
-                              </a:rPr>
-                              <m:t>𝛽</m:t>
-                            </m:r>
-                          </m:e>
-                          <m:sub>
-                            <m:r>
-                              <a:rPr lang="en-US" sz="2800" i="1">
-                                <a:solidFill>
-                                  <a:srgbClr val="FF0000"/>
-                                </a:solidFill>
-                                <a:latin typeface="Cambria Math" panose="02040503050406030204" pitchFamily="18" charset="0"/>
-                              </a:rPr>
-                              <m:t>𝑠</m:t>
-                            </m:r>
-                          </m:sub>
-                        </m:sSub>
-                      </m:num>
-                      <m:den>
+                      </m:sSubPr>
+                      <m:e>
+                        <m:r>
+                          <a:rPr lang="en-US" sz="2800" b="0" i="1" smtClean="0">
+                            <a:solidFill>
+                              <a:srgbClr val="FF0000"/>
+                            </a:solidFill>
+                            <a:latin typeface="Cambria Math" panose="02040503050406030204" pitchFamily="18" charset="0"/>
+                          </a:rPr>
+                          <m:t>𝜅</m:t>
+                        </m:r>
+                      </m:e>
+                      <m:sub>
+                        <m:r>
+                          <a:rPr lang="en-US" sz="2800" b="0" i="1" smtClean="0">
+                            <a:solidFill>
+                              <a:srgbClr val="FF0000"/>
+                            </a:solidFill>
+                            <a:latin typeface="Cambria Math" panose="02040503050406030204" pitchFamily="18" charset="0"/>
+                          </a:rPr>
+                          <m:t>𝑠</m:t>
+                        </m:r>
+                      </m:sub>
+                    </m:sSub>
+                    <m:r>
+                      <a:rPr lang="en-US" sz="2800" i="1">
+                        <a:solidFill>
+                          <a:srgbClr val="FF0000"/>
+                        </a:solidFill>
+                        <a:latin typeface="Cambria Math" panose="02040503050406030204" pitchFamily="18" charset="0"/>
+                      </a:rPr>
+                      <m:t>𝜎</m:t>
+                    </m:r>
+                    <m:sSubSup>
+                      <m:sSubSupPr>
+                        <m:ctrlPr>
+                          <a:rPr lang="en-US" sz="2800" i="1">
+                            <a:solidFill>
+                              <a:srgbClr val="FF0000"/>
+                            </a:solidFill>
+                            <a:latin typeface="Cambria Math" panose="02040503050406030204" pitchFamily="18" charset="0"/>
+                          </a:rPr>
+                        </m:ctrlPr>
+                      </m:sSubSupPr>
+                      <m:e>
+                        <m:r>
+                          <a:rPr lang="en-US" sz="2800" i="1">
+                            <a:solidFill>
+                              <a:srgbClr val="FF0000"/>
+                            </a:solidFill>
+                            <a:latin typeface="Cambria Math" panose="02040503050406030204" pitchFamily="18" charset="0"/>
+                          </a:rPr>
+                          <m:t>𝑇</m:t>
+                        </m:r>
+                      </m:e>
+                      <m:sub>
+                        <m:r>
+                          <a:rPr lang="en-US" sz="2800" i="1">
+                            <a:solidFill>
+                              <a:srgbClr val="FF0000"/>
+                            </a:solidFill>
+                            <a:latin typeface="Cambria Math" panose="02040503050406030204" pitchFamily="18" charset="0"/>
+                          </a:rPr>
+                          <m:t>𝑝</m:t>
+                        </m:r>
+                        <m:r>
+                          <a:rPr lang="en-US" sz="2800" i="1">
+                            <a:solidFill>
+                              <a:srgbClr val="FF0000"/>
+                            </a:solidFill>
+                            <a:latin typeface="Cambria Math" panose="02040503050406030204" pitchFamily="18" charset="0"/>
+                          </a:rPr>
+                          <m:t>,</m:t>
+                        </m:r>
+                        <m:r>
+                          <a:rPr lang="en-US" sz="2800" i="1">
+                            <a:solidFill>
+                              <a:srgbClr val="FF0000"/>
+                            </a:solidFill>
+                            <a:latin typeface="Cambria Math" panose="02040503050406030204" pitchFamily="18" charset="0"/>
+                          </a:rPr>
+                          <m:t>𝑠𝑢𝑟𝑓</m:t>
+                        </m:r>
+                      </m:sub>
+                      <m:sup>
                         <m:r>
                           <a:rPr lang="en-US" sz="2800" i="1">
                             <a:solidFill>
@@ -7907,105 +7872,8 @@
                           </a:rPr>
                           <m:t>4</m:t>
                         </m:r>
-                      </m:den>
-                    </m:f>
-                    <m:f>
-                      <m:fPr>
-                        <m:ctrlPr>
-                          <a:rPr lang="en-US" sz="2800" i="1">
-                            <a:solidFill>
-                              <a:srgbClr val="FF0000"/>
-                            </a:solidFill>
-                            <a:latin typeface="Cambria Math" panose="02040503050406030204" pitchFamily="18" charset="0"/>
-                          </a:rPr>
-                        </m:ctrlPr>
-                      </m:fPr>
-                      <m:num>
-                        <m:r>
-                          <a:rPr lang="en-US" sz="2800" i="1">
-                            <a:solidFill>
-                              <a:srgbClr val="FF0000"/>
-                            </a:solidFill>
-                            <a:latin typeface="Cambria Math" panose="02040503050406030204" pitchFamily="18" charset="0"/>
-                          </a:rPr>
-                          <m:t>𝜎</m:t>
-                        </m:r>
-                        <m:sSubSup>
-                          <m:sSubSupPr>
-                            <m:ctrlPr>
-                              <a:rPr lang="en-US" sz="2800" i="1">
-                                <a:solidFill>
-                                  <a:srgbClr val="FF0000"/>
-                                </a:solidFill>
-                                <a:latin typeface="Cambria Math" panose="02040503050406030204" pitchFamily="18" charset="0"/>
-                              </a:rPr>
-                            </m:ctrlPr>
-                          </m:sSubSupPr>
-                          <m:e>
-                            <m:r>
-                              <a:rPr lang="en-US" sz="2800" i="1">
-                                <a:solidFill>
-                                  <a:srgbClr val="FF0000"/>
-                                </a:solidFill>
-                                <a:latin typeface="Cambria Math" panose="02040503050406030204" pitchFamily="18" charset="0"/>
-                              </a:rPr>
-                              <m:t>𝑇</m:t>
-                            </m:r>
-                          </m:e>
-                          <m:sub>
-                            <m:r>
-                              <a:rPr lang="en-US" sz="2800" i="1">
-                                <a:solidFill>
-                                  <a:srgbClr val="FF0000"/>
-                                </a:solidFill>
-                                <a:latin typeface="Cambria Math" panose="02040503050406030204" pitchFamily="18" charset="0"/>
-                              </a:rPr>
-                              <m:t>𝑝</m:t>
-                            </m:r>
-                            <m:r>
-                              <a:rPr lang="en-US" sz="2800" i="1">
-                                <a:solidFill>
-                                  <a:srgbClr val="FF0000"/>
-                                </a:solidFill>
-                                <a:latin typeface="Cambria Math" panose="02040503050406030204" pitchFamily="18" charset="0"/>
-                              </a:rPr>
-                              <m:t>,</m:t>
-                            </m:r>
-                            <m:r>
-                              <a:rPr lang="en-US" sz="2800" i="1">
-                                <a:solidFill>
-                                  <a:srgbClr val="FF0000"/>
-                                </a:solidFill>
-                                <a:latin typeface="Cambria Math" panose="02040503050406030204" pitchFamily="18" charset="0"/>
-                              </a:rPr>
-                              <m:t>𝑠𝑢𝑟𝑓</m:t>
-                            </m:r>
-                          </m:sub>
-                          <m:sup>
-                            <m:r>
-                              <a:rPr lang="en-US" sz="2800" i="1">
-                                <a:solidFill>
-                                  <a:srgbClr val="FF0000"/>
-                                </a:solidFill>
-                                <a:latin typeface="Cambria Math" panose="02040503050406030204" pitchFamily="18" charset="0"/>
-                              </a:rPr>
-                              <m:t>4</m:t>
-                            </m:r>
-                          </m:sup>
-                        </m:sSubSup>
-                      </m:num>
-                      <m:den>
-                        <m:r>
-                          <a:rPr lang="en-US" sz="2800" i="1">
-                            <a:solidFill>
-                              <a:srgbClr val="FF0000"/>
-                            </a:solidFill>
-                            <a:latin typeface="Cambria Math" panose="02040503050406030204" pitchFamily="18" charset="0"/>
-                          </a:rPr>
-                          <m:t>𝜋</m:t>
-                        </m:r>
-                      </m:den>
-                    </m:f>
+                      </m:sup>
+                    </m:sSubSup>
                   </m:oMath>
                 </a14:m>
                 <a:endParaRPr lang="en-US" sz="2800" dirty="0"/>
@@ -8013,7 +7881,7 @@
             </p:txBody>
           </p:sp>
         </mc:Choice>
-        <mc:Fallback xmlns="">
+        <mc:Fallback>
           <p:sp>
             <p:nvSpPr>
               <p:cNvPr id="4" name="TextBox 3">
@@ -8031,7 +7899,7 @@
             <p:spPr>
               <a:xfrm>
                 <a:off x="934948" y="1592495"/>
-                <a:ext cx="4982967" cy="3697038"/>
+                <a:ext cx="4982967" cy="3401829"/>
               </a:xfrm>
               <a:prstGeom prst="rect">
                 <a:avLst/>
@@ -8039,7 +7907,7 @@
               <a:blipFill>
                 <a:blip r:embed="rId2"/>
                 <a:stretch>
-                  <a:fillRect l="-2200" t="-1483" b="-1318"/>
+                  <a:fillRect l="-2200" t="-1613" b="-2867"/>
                 </a:stretch>
               </a:blipFill>
             </p:spPr>

</xml_diff>